<commit_message>
Cleanup files and ML modification on PPT
</commit_message>
<xml_diff>
--- a/Education for income.pptx
+++ b/Education for income.pptx
@@ -211,7 +211,7 @@
           <a:p>
             <a:fld id="{640C3D37-B52B-421F-9961-BB6057BDE57F}" type="datetimeFigureOut">
               <a:rPr lang="en-US" smtClean="0"/>
-              <a:t>8/30/2022</a:t>
+              <a:t>8/31/2022</a:t>
             </a:fld>
             <a:endParaRPr lang="en-US"/>
           </a:p>
@@ -1494,7 +1494,7 @@
           <a:p>
             <a:fld id="{C2537300-66FB-4C6C-A55A-973C72232D20}" type="datetimeFigureOut">
               <a:rPr lang="en-US" smtClean="0"/>
-              <a:t>8/30/2022</a:t>
+              <a:t>8/31/2022</a:t>
             </a:fld>
             <a:endParaRPr lang="en-US"/>
           </a:p>
@@ -1692,7 +1692,7 @@
           <a:p>
             <a:fld id="{C2537300-66FB-4C6C-A55A-973C72232D20}" type="datetimeFigureOut">
               <a:rPr lang="en-US" smtClean="0"/>
-              <a:t>8/30/2022</a:t>
+              <a:t>8/31/2022</a:t>
             </a:fld>
             <a:endParaRPr lang="en-US"/>
           </a:p>
@@ -1900,7 +1900,7 @@
           <a:p>
             <a:fld id="{C2537300-66FB-4C6C-A55A-973C72232D20}" type="datetimeFigureOut">
               <a:rPr lang="en-US" smtClean="0"/>
-              <a:t>8/30/2022</a:t>
+              <a:t>8/31/2022</a:t>
             </a:fld>
             <a:endParaRPr lang="en-US"/>
           </a:p>
@@ -7313,7 +7313,7 @@
           <a:p>
             <a:fld id="{C2537300-66FB-4C6C-A55A-973C72232D20}" type="datetimeFigureOut">
               <a:rPr lang="en-US" smtClean="0"/>
-              <a:t>8/30/2022</a:t>
+              <a:t>8/31/2022</a:t>
             </a:fld>
             <a:endParaRPr lang="en-US"/>
           </a:p>
@@ -13872,7 +13872,7 @@
           <a:p>
             <a:fld id="{C2537300-66FB-4C6C-A55A-973C72232D20}" type="datetimeFigureOut">
               <a:rPr lang="en-US" smtClean="0"/>
-              <a:t>8/30/2022</a:t>
+              <a:t>8/31/2022</a:t>
             </a:fld>
             <a:endParaRPr lang="en-US"/>
           </a:p>
@@ -15272,7 +15272,7 @@
           <a:p>
             <a:fld id="{C2537300-66FB-4C6C-A55A-973C72232D20}" type="datetimeFigureOut">
               <a:rPr lang="en-US" smtClean="0"/>
-              <a:t>8/30/2022</a:t>
+              <a:t>8/31/2022</a:t>
             </a:fld>
             <a:endParaRPr lang="en-US"/>
           </a:p>
@@ -15684,7 +15684,7 @@
           <a:p>
             <a:fld id="{C2537300-66FB-4C6C-A55A-973C72232D20}" type="datetimeFigureOut">
               <a:rPr lang="en-US" smtClean="0"/>
-              <a:t>8/30/2022</a:t>
+              <a:t>8/31/2022</a:t>
             </a:fld>
             <a:endParaRPr lang="en-US"/>
           </a:p>
@@ -15825,7 +15825,7 @@
           <a:p>
             <a:fld id="{C2537300-66FB-4C6C-A55A-973C72232D20}" type="datetimeFigureOut">
               <a:rPr lang="en-US" smtClean="0"/>
-              <a:t>8/30/2022</a:t>
+              <a:t>8/31/2022</a:t>
             </a:fld>
             <a:endParaRPr lang="en-US"/>
           </a:p>
@@ -15938,7 +15938,7 @@
           <a:p>
             <a:fld id="{C2537300-66FB-4C6C-A55A-973C72232D20}" type="datetimeFigureOut">
               <a:rPr lang="en-US" smtClean="0"/>
-              <a:t>8/30/2022</a:t>
+              <a:t>8/31/2022</a:t>
             </a:fld>
             <a:endParaRPr lang="en-US"/>
           </a:p>
@@ -16249,7 +16249,7 @@
           <a:p>
             <a:fld id="{C2537300-66FB-4C6C-A55A-973C72232D20}" type="datetimeFigureOut">
               <a:rPr lang="en-US" smtClean="0"/>
-              <a:t>8/30/2022</a:t>
+              <a:t>8/31/2022</a:t>
             </a:fld>
             <a:endParaRPr lang="en-US"/>
           </a:p>
@@ -16537,7 +16537,7 @@
           <a:p>
             <a:fld id="{C2537300-66FB-4C6C-A55A-973C72232D20}" type="datetimeFigureOut">
               <a:rPr lang="en-US" smtClean="0"/>
-              <a:t>8/30/2022</a:t>
+              <a:t>8/31/2022</a:t>
             </a:fld>
             <a:endParaRPr lang="en-US"/>
           </a:p>
@@ -16778,7 +16778,7 @@
           <a:p>
             <a:fld id="{C2537300-66FB-4C6C-A55A-973C72232D20}" type="datetimeFigureOut">
               <a:rPr lang="en-US" smtClean="0"/>
-              <a:t>8/30/2022</a:t>
+              <a:t>8/31/2022</a:t>
             </a:fld>
             <a:endParaRPr lang="en-US"/>
           </a:p>
@@ -23805,7 +23805,7 @@
         </p:nvSpPr>
         <p:spPr>
           <a:xfrm>
-            <a:off x="0" y="293688"/>
+            <a:off x="0" y="242888"/>
             <a:ext cx="10007600" cy="833437"/>
           </a:xfrm>
           <a:prstGeom prst="rect">
@@ -23973,10 +23973,10 @@
       </p:sp>
       <p:pic>
         <p:nvPicPr>
-          <p:cNvPr id="5" name="Picture 4" descr="Chart, scatter chart&#10;&#10;Description automatically generated">
+          <p:cNvPr id="3" name="Picture 2" descr="Chart, scatter chart&#10;&#10;Description automatically generated">
             <a:extLst>
               <a:ext uri="{FF2B5EF4-FFF2-40B4-BE49-F238E27FC236}">
-                <a16:creationId xmlns:a16="http://schemas.microsoft.com/office/drawing/2014/main" id="{492AE9A7-4203-6C6E-357D-BED92E2AC9C0}"/>
+                <a16:creationId xmlns:a16="http://schemas.microsoft.com/office/drawing/2014/main" id="{13ADB4DC-50E2-EF1A-D5FD-0EFCFAED55C4}"/>
               </a:ext>
             </a:extLst>
           </p:cNvPr>
@@ -23999,8 +23999,8 @@
         </p:blipFill>
         <p:spPr>
           <a:xfrm>
-            <a:off x="4958080" y="108470"/>
-            <a:ext cx="6868160" cy="6332970"/>
+            <a:off x="5313680" y="1076324"/>
+            <a:ext cx="6339840" cy="5029836"/>
           </a:xfrm>
           <a:prstGeom prst="rect">
             <a:avLst/>
@@ -25499,85 +25499,6 @@
       </p:sp>
       <p:sp>
         <p:nvSpPr>
-          <p:cNvPr id="220" name="Google Shape;220;p27"/>
-          <p:cNvSpPr txBox="1">
-            <a:spLocks noGrp="1"/>
-          </p:cNvSpPr>
-          <p:nvPr>
-            <p:ph type="body" idx="4294967295"/>
-          </p:nvPr>
-        </p:nvSpPr>
-        <p:spPr>
-          <a:xfrm>
-            <a:off x="0" y="1778000"/>
-            <a:ext cx="11814175" cy="915912"/>
-          </a:xfrm>
-          <a:prstGeom prst="rect">
-            <a:avLst/>
-          </a:prstGeom>
-        </p:spPr>
-        <p:txBody>
-          <a:bodyPr spcFirstLastPara="1" wrap="square" lIns="121900" tIns="121900" rIns="121900" bIns="121900" anchor="t" anchorCtr="0">
-            <a:noAutofit/>
-          </a:bodyPr>
-          <a:lstStyle/>
-          <a:p>
-            <a:pPr indent="-457189">
-              <a:buClr>
-                <a:srgbClr val="000000"/>
-              </a:buClr>
-              <a:buSzPts val="1800"/>
-              <a:buChar char="❖"/>
-            </a:pPr>
-            <a:r>
-              <a:rPr lang="en" sz="2400" b="1" dirty="0">
-                <a:solidFill>
-                  <a:srgbClr val="000000"/>
-                </a:solidFill>
-              </a:rPr>
-              <a:t>Prove: </a:t>
-            </a:r>
-            <a:r>
-              <a:rPr lang="en" sz="2133" dirty="0">
-                <a:solidFill>
-                  <a:srgbClr val="000000"/>
-                </a:solidFill>
-              </a:rPr>
-              <a:t> Bachelors percentage and postsecondary degre percentage are strongly correlated to the per capita income by State </a:t>
-            </a:r>
-            <a:endParaRPr sz="2400" dirty="0">
-              <a:solidFill>
-                <a:srgbClr val="000000"/>
-              </a:solidFill>
-            </a:endParaRPr>
-          </a:p>
-          <a:p>
-            <a:pPr marL="0" indent="0">
-              <a:buNone/>
-            </a:pPr>
-            <a:endParaRPr sz="1867" dirty="0">
-              <a:solidFill>
-                <a:srgbClr val="000000"/>
-              </a:solidFill>
-              <a:latin typeface="Arial"/>
-              <a:ea typeface="Arial"/>
-              <a:cs typeface="Arial"/>
-              <a:sym typeface="Arial"/>
-            </a:endParaRPr>
-          </a:p>
-          <a:p>
-            <a:pPr marL="0" indent="0">
-              <a:spcAft>
-                <a:spcPts val="2133"/>
-              </a:spcAft>
-              <a:buNone/>
-            </a:pPr>
-            <a:endParaRPr sz="1867" dirty="0"/>
-          </a:p>
-        </p:txBody>
-      </p:sp>
-      <p:sp>
-        <p:nvSpPr>
           <p:cNvPr id="224" name="Google Shape;224;p27"/>
           <p:cNvSpPr txBox="1"/>
           <p:nvPr/>
@@ -25585,7 +25506,7 @@
         <p:spPr>
           <a:xfrm>
             <a:off x="101600" y="914400"/>
-            <a:ext cx="11622800" cy="1006400"/>
+            <a:ext cx="11622800" cy="629920"/>
           </a:xfrm>
           <a:prstGeom prst="rect">
             <a:avLst/>
@@ -25613,7 +25534,7 @@
               <a:buChar char="❖"/>
             </a:pPr>
             <a:r>
-              <a:rPr lang="en" sz="2400" kern="0">
+              <a:rPr lang="en" sz="2400" kern="0" dirty="0">
                 <a:solidFill>
                   <a:srgbClr val="000000"/>
                 </a:solidFill>
@@ -25624,7 +25545,7 @@
               </a:rPr>
               <a:t>Cleanup of merged_results for Machine Learning purposes</a:t>
             </a:r>
-            <a:endParaRPr sz="2400" kern="0">
+            <a:endParaRPr sz="2400" kern="0" dirty="0">
               <a:solidFill>
                 <a:srgbClr val="000000"/>
               </a:solidFill>
@@ -25634,48 +25555,14 @@
               <a:sym typeface="Calibri"/>
             </a:endParaRPr>
           </a:p>
-          <a:p>
-            <a:pPr marL="1219170" lvl="1" indent="-457189" defTabSz="1219170">
-              <a:lnSpc>
-                <a:spcPct val="115000"/>
-              </a:lnSpc>
-              <a:buClr>
-                <a:srgbClr val="000000"/>
-              </a:buClr>
-              <a:buSzPts val="1800"/>
-              <a:buFont typeface="Calibri"/>
-              <a:buChar char="➢"/>
-            </a:pPr>
-            <a:r>
-              <a:rPr lang="en" sz="2400" kern="0">
-                <a:solidFill>
-                  <a:srgbClr val="000000"/>
-                </a:solidFill>
-                <a:latin typeface="Calibri"/>
-                <a:ea typeface="Calibri"/>
-                <a:cs typeface="Calibri"/>
-                <a:sym typeface="Calibri"/>
-              </a:rPr>
-              <a:t>Changed per capita income from $ to % </a:t>
-            </a:r>
-            <a:endParaRPr sz="2400" kern="0">
-              <a:solidFill>
-                <a:srgbClr val="000000"/>
-              </a:solidFill>
-              <a:latin typeface="Calibri"/>
-              <a:ea typeface="Calibri"/>
-              <a:cs typeface="Calibri"/>
-              <a:sym typeface="Calibri"/>
-            </a:endParaRPr>
-          </a:p>
         </p:txBody>
       </p:sp>
       <p:pic>
         <p:nvPicPr>
-          <p:cNvPr id="6" name="Picture 5" descr="Chart, scatter chart&#10;&#10;Description automatically generated">
+          <p:cNvPr id="8" name="Picture 7" descr="A picture containing text&#10;&#10;Description automatically generated">
             <a:extLst>
               <a:ext uri="{FF2B5EF4-FFF2-40B4-BE49-F238E27FC236}">
-                <a16:creationId xmlns:a16="http://schemas.microsoft.com/office/drawing/2014/main" id="{EE90EB5E-89F6-EEC7-EFE2-E38F105499FA}"/>
+                <a16:creationId xmlns:a16="http://schemas.microsoft.com/office/drawing/2014/main" id="{C9D608CE-A487-1DB1-B57E-BB8A0FDA4227}"/>
               </a:ext>
             </a:extLst>
           </p:cNvPr>
@@ -25698,8 +25585,8 @@
         </p:blipFill>
         <p:spPr>
           <a:xfrm>
-            <a:off x="1320611" y="2865120"/>
-            <a:ext cx="5445949" cy="3851592"/>
+            <a:off x="7457440" y="6086792"/>
+            <a:ext cx="3698239" cy="629920"/>
           </a:xfrm>
           <a:prstGeom prst="rect">
             <a:avLst/>
@@ -25708,10 +25595,10 @@
       </p:pic>
       <p:pic>
         <p:nvPicPr>
-          <p:cNvPr id="8" name="Picture 7" descr="A picture containing text&#10;&#10;Description automatically generated">
+          <p:cNvPr id="3" name="Picture 2" descr="Table&#10;&#10;Description automatically generated">
             <a:extLst>
               <a:ext uri="{FF2B5EF4-FFF2-40B4-BE49-F238E27FC236}">
-                <a16:creationId xmlns:a16="http://schemas.microsoft.com/office/drawing/2014/main" id="{C9D608CE-A487-1DB1-B57E-BB8A0FDA4227}"/>
+                <a16:creationId xmlns:a16="http://schemas.microsoft.com/office/drawing/2014/main" id="{101B974E-9133-2645-73F8-469D77B86EF6}"/>
               </a:ext>
             </a:extLst>
           </p:cNvPr>
@@ -25734,8 +25621,44 @@
         </p:blipFill>
         <p:spPr>
           <a:xfrm>
-            <a:off x="7457440" y="4582160"/>
-            <a:ext cx="3698239" cy="1397000"/>
+            <a:off x="761525" y="1492568"/>
+            <a:ext cx="9246075" cy="2439352"/>
+          </a:xfrm>
+          <a:prstGeom prst="rect">
+            <a:avLst/>
+          </a:prstGeom>
+        </p:spPr>
+      </p:pic>
+      <p:pic>
+        <p:nvPicPr>
+          <p:cNvPr id="5" name="Picture 4" descr="Scatter chart&#10;&#10;Description automatically generated with low confidence">
+            <a:extLst>
+              <a:ext uri="{FF2B5EF4-FFF2-40B4-BE49-F238E27FC236}">
+                <a16:creationId xmlns:a16="http://schemas.microsoft.com/office/drawing/2014/main" id="{9DD30FF9-4A3D-D8A0-438E-360212055584}"/>
+              </a:ext>
+            </a:extLst>
+          </p:cNvPr>
+          <p:cNvPicPr>
+            <a:picLocks noChangeAspect="1"/>
+          </p:cNvPicPr>
+          <p:nvPr/>
+        </p:nvPicPr>
+        <p:blipFill>
+          <a:blip r:embed="rId5">
+            <a:extLst>
+              <a:ext uri="{28A0092B-C50C-407E-A947-70E740481C1C}">
+                <a14:useLocalDpi xmlns:a14="http://schemas.microsoft.com/office/drawing/2010/main" val="0"/>
+              </a:ext>
+            </a:extLst>
+          </a:blip>
+          <a:stretch>
+            <a:fillRect/>
+          </a:stretch>
+        </p:blipFill>
+        <p:spPr>
+          <a:xfrm>
+            <a:off x="761525" y="4084320"/>
+            <a:ext cx="9246075" cy="1737360"/>
           </a:xfrm>
           <a:prstGeom prst="rect">
             <a:avLst/>

</xml_diff>